<commit_message>
Create script for converting PPTX to PDF
</commit_message>
<xml_diff>
--- a/Vorlesung/3 Vererbung-Polymorphie.pptx
+++ b/Vorlesung/3 Vererbung-Polymorphie.pptx
@@ -2777,7 +2777,13 @@
               <a:rPr lang="de-DE" altLang="de-DE" dirty="0" smtClean="0">
                 <a:latin typeface="Times New Roman" pitchFamily="16" charset="0"/>
               </a:rPr>
-              <a:t>	- Andere Mechanismen als Polymorphie: </a:t>
+              <a:t>	- </a:t>
+            </a:r>
+            <a:r>
+              <a:rPr lang="de-DE" altLang="de-DE" dirty="0" smtClean="0">
+                <a:latin typeface="Times New Roman" pitchFamily="16" charset="0"/>
+              </a:rPr>
+              <a:t>Mechanismen für Polymorphie: Dynamisches Binden (Klassen), </a:t>
             </a:r>
             <a:r>
               <a:rPr lang="de-DE" altLang="de-DE" dirty="0" err="1" smtClean="0">
@@ -4653,48 +4659,16 @@
             </a:pPr>
             <a:r>
               <a:rPr lang="de-DE" baseline="0" dirty="0" smtClean="0"/>
-              <a:t>Intuitiv erwartet man: Hier </a:t>
+              <a:t> </a:t>
+            </a:r>
+            <a:r>
+              <a:rPr lang="de-DE" baseline="0" smtClean="0"/>
+              <a:t>siehe nächste </a:t>
             </a:r>
             <a:r>
               <a:rPr lang="de-DE" baseline="0" dirty="0" smtClean="0"/>
-              <a:t>wird zunächst eine Instanz per </a:t>
-            </a:r>
-            <a:r>
-              <a:rPr lang="de-DE" baseline="0" dirty="0" err="1" smtClean="0"/>
-              <a:t>Defaul</a:t>
-            </a:r>
-            <a:r>
-              <a:rPr lang="de-DE" baseline="0" dirty="0" smtClean="0"/>
-              <a:t>-Konstruktor angelegt und dann mittels </a:t>
-            </a:r>
-            <a:r>
-              <a:rPr lang="de-DE" baseline="0" dirty="0" err="1" smtClean="0"/>
-              <a:t>operator</a:t>
-            </a:r>
-            <a:r>
-              <a:rPr lang="de-DE" baseline="0" dirty="0" smtClean="0"/>
-              <a:t>= „</a:t>
-            </a:r>
-            <a:r>
-              <a:rPr lang="de-DE" baseline="0" dirty="0" smtClean="0"/>
-              <a:t>überschrieben/aktualisiert</a:t>
-            </a:r>
-          </a:p>
-          <a:p>
-            <a:pPr marL="914400" lvl="1" indent="-171450">
-              <a:buFontTx/>
-              <a:buChar char="-"/>
-              <a:defRPr/>
-            </a:pPr>
-            <a:r>
-              <a:rPr lang="de-DE" baseline="0" dirty="0" smtClean="0"/>
-              <a:t>siehe auch </a:t>
-            </a:r>
-            <a:r>
-              <a:rPr lang="de-DE" baseline="0" smtClean="0"/>
-              <a:t>nächste Folie!!</a:t>
-            </a:r>
-            <a:endParaRPr lang="de-DE" baseline="0" dirty="0" smtClean="0"/>
+              <a:t>Folie!!</a:t>
+            </a:r>
           </a:p>
           <a:p>
             <a:pPr marL="171450" marR="0" indent="-171450" algn="l" defTabSz="449263" rtl="0" eaLnBrk="0" fontAlgn="base" latinLnBrk="0" hangingPunct="0">
@@ -10066,7 +10040,7 @@
           <a:graphicData uri="http://schemas.openxmlformats.org/presentationml/2006/ole">
             <mc:AlternateContent xmlns:mc="http://schemas.openxmlformats.org/markup-compatibility/2006">
               <mc:Choice xmlns:v="urn:schemas-microsoft-com:vml" Requires="v">
-                <p:oleObj spid="_x0000_s1076" r:id="rId16" imgW="1038370" imgH="980952" progId="">
+                <p:oleObj spid="_x0000_s1078" r:id="rId16" imgW="1038370" imgH="980952" progId="">
                   <p:embed/>
                 </p:oleObj>
               </mc:Choice>
@@ -10504,7 +10478,7 @@
                 </a:lnSpc>
                 <a:defRPr/>
               </a:pPr>
-              <a:t>27.08.2014</a:t>
+              <a:t>08.09.2014</a:t>
             </a:fld>
             <a:r>
               <a:rPr lang="en-GB" altLang="de-DE" sz="1000" smtClean="0">
@@ -25701,7 +25675,23 @@
                   <a:schemeClr val="bg1"/>
                 </a:solidFill>
               </a:rPr>
-              <a:t>Dies muss nicht in Subklassen wiederholt werden, wird aber häufig der Übersichtshalber gemacht</a:t>
+              <a:t>Dies muss nicht in Subklassen wiederholt werden, wird aber häufig der </a:t>
+            </a:r>
+            <a:r>
+              <a:rPr lang="de-DE" dirty="0" smtClean="0">
+                <a:solidFill>
+                  <a:schemeClr val="bg1"/>
+                </a:solidFill>
+              </a:rPr>
+              <a:t>Übersicht halber </a:t>
+            </a:r>
+            <a:r>
+              <a:rPr lang="de-DE" dirty="0">
+                <a:solidFill>
+                  <a:schemeClr val="bg1"/>
+                </a:solidFill>
+              </a:rPr>
+              <a:t>gemacht</a:t>
             </a:r>
           </a:p>
         </p:txBody>

</xml_diff>